<commit_message>
More poster things ;-; -Alexis
</commit_message>
<xml_diff>
--- a/ResearchPresentation.pptx
+++ b/ResearchPresentation.pptx
@@ -5,19 +5,23 @@
     <p:sldMasterId id="2147483648" r:id="rId1"/>
   </p:sldMasterIdLst>
   <p:notesMasterIdLst>
-    <p:notesMasterId r:id="rId9"/>
+    <p:notesMasterId r:id="rId13"/>
   </p:notesMasterIdLst>
   <p:handoutMasterIdLst>
-    <p:handoutMasterId r:id="rId10"/>
+    <p:handoutMasterId r:id="rId14"/>
   </p:handoutMasterIdLst>
   <p:sldIdLst>
     <p:sldId id="258" r:id="rId2"/>
     <p:sldId id="260" r:id="rId3"/>
-    <p:sldId id="259" r:id="rId4"/>
-    <p:sldId id="261" r:id="rId5"/>
-    <p:sldId id="262" r:id="rId6"/>
-    <p:sldId id="263" r:id="rId7"/>
-    <p:sldId id="264" r:id="rId8"/>
+    <p:sldId id="265" r:id="rId4"/>
+    <p:sldId id="267" r:id="rId5"/>
+    <p:sldId id="259" r:id="rId6"/>
+    <p:sldId id="261" r:id="rId7"/>
+    <p:sldId id="262" r:id="rId8"/>
+    <p:sldId id="263" r:id="rId9"/>
+    <p:sldId id="264" r:id="rId10"/>
+    <p:sldId id="268" r:id="rId11"/>
+    <p:sldId id="269" r:id="rId12"/>
   </p:sldIdLst>
   <p:sldSz cx="9144000" cy="5143500" type="screen16x9"/>
   <p:notesSz cx="6858000" cy="9144000"/>
@@ -267,7 +271,7 @@
             <a:fld id="{478FD408-A865-FD43-BD8A-60A14765CAA4}" type="datetimeFigureOut">
               <a:rPr lang="en-US" smtClean="0"/>
               <a:pPr/>
-              <a:t>4/28/2019</a:t>
+              <a:t>4/29/2019</a:t>
             </a:fld>
             <a:endParaRPr lang="en-US"/>
           </a:p>
@@ -434,7 +438,7 @@
             <a:fld id="{77D11DA4-9F5C-6145-8010-1CB02F8CA18F}" type="datetimeFigureOut">
               <a:rPr lang="en-US" smtClean="0"/>
               <a:pPr/>
-              <a:t>4/28/2019</a:t>
+              <a:t>4/29/2019</a:t>
             </a:fld>
             <a:endParaRPr lang="en-US"/>
           </a:p>
@@ -3722,6 +3726,222 @@
 </p:sld>
 </file>
 
+<file path=ppt/slides/slide10.xml><?xml version="1.0" encoding="utf-8"?>
+<p:sld xmlns:a="http://schemas.openxmlformats.org/drawingml/2006/main" xmlns:r="http://schemas.openxmlformats.org/officeDocument/2006/relationships" xmlns:p="http://schemas.openxmlformats.org/presentationml/2006/main">
+  <p:cSld>
+    <p:spTree>
+      <p:nvGrpSpPr>
+        <p:cNvPr id="1" name=""/>
+        <p:cNvGrpSpPr/>
+        <p:nvPr/>
+      </p:nvGrpSpPr>
+      <p:grpSpPr>
+        <a:xfrm>
+          <a:off x="0" y="0"/>
+          <a:ext cx="0" cy="0"/>
+          <a:chOff x="0" y="0"/>
+          <a:chExt cx="0" cy="0"/>
+        </a:xfrm>
+      </p:grpSpPr>
+      <p:sp>
+        <p:nvSpPr>
+          <p:cNvPr id="2" name="Title 1">
+            <a:extLst>
+              <a:ext uri="{FF2B5EF4-FFF2-40B4-BE49-F238E27FC236}">
+                <a16:creationId xmlns:a16="http://schemas.microsoft.com/office/drawing/2014/main" id="{34CCECC2-11CA-4E30-95E9-0156A17952DF}"/>
+              </a:ext>
+            </a:extLst>
+          </p:cNvPr>
+          <p:cNvSpPr>
+            <a:spLocks noGrp="1"/>
+          </p:cNvSpPr>
+          <p:nvPr>
+            <p:ph type="title"/>
+          </p:nvPr>
+        </p:nvSpPr>
+        <p:spPr/>
+        <p:txBody>
+          <a:bodyPr/>
+          <a:lstStyle/>
+          <a:p>
+            <a:r>
+              <a:rPr lang="en-US" dirty="0"/>
+              <a:t>User Feedback</a:t>
+            </a:r>
+          </a:p>
+        </p:txBody>
+      </p:sp>
+      <p:sp>
+        <p:nvSpPr>
+          <p:cNvPr id="3" name="Content Placeholder 2">
+            <a:extLst>
+              <a:ext uri="{FF2B5EF4-FFF2-40B4-BE49-F238E27FC236}">
+                <a16:creationId xmlns:a16="http://schemas.microsoft.com/office/drawing/2014/main" id="{E542DA00-300E-4D21-9014-FD7F47435E4C}"/>
+              </a:ext>
+            </a:extLst>
+          </p:cNvPr>
+          <p:cNvSpPr>
+            <a:spLocks noGrp="1"/>
+          </p:cNvSpPr>
+          <p:nvPr>
+            <p:ph idx="1"/>
+          </p:nvPr>
+        </p:nvSpPr>
+        <p:spPr/>
+        <p:txBody>
+          <a:bodyPr/>
+          <a:lstStyle/>
+          <a:p>
+            <a:endParaRPr lang="en-US"/>
+          </a:p>
+        </p:txBody>
+      </p:sp>
+      <p:sp>
+        <p:nvSpPr>
+          <p:cNvPr id="4" name="Text Placeholder 3">
+            <a:extLst>
+              <a:ext uri="{FF2B5EF4-FFF2-40B4-BE49-F238E27FC236}">
+                <a16:creationId xmlns:a16="http://schemas.microsoft.com/office/drawing/2014/main" id="{092019FF-0572-4AE2-9B63-7700E16753AF}"/>
+              </a:ext>
+            </a:extLst>
+          </p:cNvPr>
+          <p:cNvSpPr>
+            <a:spLocks noGrp="1"/>
+          </p:cNvSpPr>
+          <p:nvPr>
+            <p:ph type="body" sz="quarter" idx="10"/>
+          </p:nvPr>
+        </p:nvSpPr>
+        <p:spPr/>
+        <p:txBody>
+          <a:bodyPr/>
+          <a:lstStyle/>
+          <a:p>
+            <a:endParaRPr lang="en-US"/>
+          </a:p>
+        </p:txBody>
+      </p:sp>
+    </p:spTree>
+    <p:extLst>
+      <p:ext uri="{BB962C8B-B14F-4D97-AF65-F5344CB8AC3E}">
+        <p14:creationId xmlns:p14="http://schemas.microsoft.com/office/powerpoint/2010/main" val="1769401079"/>
+      </p:ext>
+    </p:extLst>
+  </p:cSld>
+  <p:clrMapOvr>
+    <a:masterClrMapping/>
+  </p:clrMapOvr>
+</p:sld>
+</file>
+
+<file path=ppt/slides/slide11.xml><?xml version="1.0" encoding="utf-8"?>
+<p:sld xmlns:a="http://schemas.openxmlformats.org/drawingml/2006/main" xmlns:r="http://schemas.openxmlformats.org/officeDocument/2006/relationships" xmlns:p="http://schemas.openxmlformats.org/presentationml/2006/main">
+  <p:cSld>
+    <p:spTree>
+      <p:nvGrpSpPr>
+        <p:cNvPr id="1" name=""/>
+        <p:cNvGrpSpPr/>
+        <p:nvPr/>
+      </p:nvGrpSpPr>
+      <p:grpSpPr>
+        <a:xfrm>
+          <a:off x="0" y="0"/>
+          <a:ext cx="0" cy="0"/>
+          <a:chOff x="0" y="0"/>
+          <a:chExt cx="0" cy="0"/>
+        </a:xfrm>
+      </p:grpSpPr>
+      <p:sp>
+        <p:nvSpPr>
+          <p:cNvPr id="2" name="Title 1">
+            <a:extLst>
+              <a:ext uri="{FF2B5EF4-FFF2-40B4-BE49-F238E27FC236}">
+                <a16:creationId xmlns:a16="http://schemas.microsoft.com/office/drawing/2014/main" id="{525D101E-F333-44A0-91A6-B6616138B669}"/>
+              </a:ext>
+            </a:extLst>
+          </p:cNvPr>
+          <p:cNvSpPr>
+            <a:spLocks noGrp="1"/>
+          </p:cNvSpPr>
+          <p:nvPr>
+            <p:ph type="title"/>
+          </p:nvPr>
+        </p:nvSpPr>
+        <p:spPr/>
+        <p:txBody>
+          <a:bodyPr/>
+          <a:lstStyle/>
+          <a:p>
+            <a:r>
+              <a:rPr lang="en-US" dirty="0"/>
+              <a:t>Conclusion and Analysis</a:t>
+            </a:r>
+          </a:p>
+        </p:txBody>
+      </p:sp>
+      <p:sp>
+        <p:nvSpPr>
+          <p:cNvPr id="3" name="Content Placeholder 2">
+            <a:extLst>
+              <a:ext uri="{FF2B5EF4-FFF2-40B4-BE49-F238E27FC236}">
+                <a16:creationId xmlns:a16="http://schemas.microsoft.com/office/drawing/2014/main" id="{A99CB495-0344-441F-B448-BF3746B19CC4}"/>
+              </a:ext>
+            </a:extLst>
+          </p:cNvPr>
+          <p:cNvSpPr>
+            <a:spLocks noGrp="1"/>
+          </p:cNvSpPr>
+          <p:nvPr>
+            <p:ph idx="1"/>
+          </p:nvPr>
+        </p:nvSpPr>
+        <p:spPr/>
+        <p:txBody>
+          <a:bodyPr/>
+          <a:lstStyle/>
+          <a:p>
+            <a:endParaRPr lang="en-US"/>
+          </a:p>
+        </p:txBody>
+      </p:sp>
+      <p:sp>
+        <p:nvSpPr>
+          <p:cNvPr id="4" name="Text Placeholder 3">
+            <a:extLst>
+              <a:ext uri="{FF2B5EF4-FFF2-40B4-BE49-F238E27FC236}">
+                <a16:creationId xmlns:a16="http://schemas.microsoft.com/office/drawing/2014/main" id="{5B4ADCEE-E165-4E44-8499-57CFA7426032}"/>
+              </a:ext>
+            </a:extLst>
+          </p:cNvPr>
+          <p:cNvSpPr>
+            <a:spLocks noGrp="1"/>
+          </p:cNvSpPr>
+          <p:nvPr>
+            <p:ph type="body" sz="quarter" idx="10"/>
+          </p:nvPr>
+        </p:nvSpPr>
+        <p:spPr/>
+        <p:txBody>
+          <a:bodyPr/>
+          <a:lstStyle/>
+          <a:p>
+            <a:endParaRPr lang="en-US"/>
+          </a:p>
+        </p:txBody>
+      </p:sp>
+    </p:spTree>
+    <p:extLst>
+      <p:ext uri="{BB962C8B-B14F-4D97-AF65-F5344CB8AC3E}">
+        <p14:creationId xmlns:p14="http://schemas.microsoft.com/office/powerpoint/2010/main" val="1205936941"/>
+      </p:ext>
+    </p:extLst>
+  </p:cSld>
+  <p:clrMapOvr>
+    <a:masterClrMapping/>
+  </p:clrMapOvr>
+</p:sld>
+</file>
+
 <file path=ppt/slides/slide2.xml><?xml version="1.0" encoding="utf-8"?>
 <p:sld xmlns:a="http://schemas.openxmlformats.org/drawingml/2006/main" xmlns:r="http://schemas.openxmlformats.org/officeDocument/2006/relationships" xmlns:p="http://schemas.openxmlformats.org/presentationml/2006/main">
   <p:cSld>
@@ -3788,7 +4008,41 @@
           <a:bodyPr/>
           <a:lstStyle/>
           <a:p>
-            <a:endParaRPr lang="en-US" dirty="0"/>
+            <a:pPr marL="0" indent="0">
+              <a:buNone/>
+            </a:pPr>
+            <a:r>
+              <a:rPr lang="en-US" sz="2400" dirty="0"/>
+              <a:t>The aim of this project is to </a:t>
+            </a:r>
+            <a:r>
+              <a:rPr lang="en-US" sz="2400" u="sng" dirty="0"/>
+              <a:t>identify a chosen object of interest at range</a:t>
+            </a:r>
+            <a:r>
+              <a:rPr lang="en-US" sz="2400" dirty="0"/>
+              <a:t> using a camera feed and an image processing algorithm to assist in the detection, identification and tracking of the target. </a:t>
+            </a:r>
+          </a:p>
+          <a:p>
+            <a:pPr marL="0" indent="0">
+              <a:buNone/>
+            </a:pPr>
+            <a:r>
+              <a:rPr lang="en-US" sz="2400" dirty="0"/>
+              <a:t>This solution was then implemented as a rail-mounted tactical scope attachment for a Nerf Blaster. The attachment provides the user with </a:t>
+            </a:r>
+            <a:r>
+              <a:rPr lang="en-US" sz="2400" u="sng" dirty="0"/>
+              <a:t>real-time feedback</a:t>
+            </a:r>
+            <a:r>
+              <a:rPr lang="en-US" sz="2400" dirty="0"/>
+              <a:t> on their aim using a side mounted screen.</a:t>
+            </a:r>
+          </a:p>
+          <a:p>
+            <a:endParaRPr lang="en-US" sz="2400" dirty="0"/>
           </a:p>
         </p:txBody>
       </p:sp>
@@ -3849,7 +4103,13 @@
       </p:grpSpPr>
       <p:sp>
         <p:nvSpPr>
-          <p:cNvPr id="2" name="Title 1"/>
+          <p:cNvPr id="2" name="Title 1">
+            <a:extLst>
+              <a:ext uri="{FF2B5EF4-FFF2-40B4-BE49-F238E27FC236}">
+                <a16:creationId xmlns:a16="http://schemas.microsoft.com/office/drawing/2014/main" id="{A7BB6C42-3D1F-4B9F-ACD9-0054BAD3C71F}"/>
+              </a:ext>
+            </a:extLst>
+          </p:cNvPr>
           <p:cNvSpPr>
             <a:spLocks noGrp="1"/>
           </p:cNvSpPr>
@@ -3864,14 +4124,20 @@
           <a:p>
             <a:r>
               <a:rPr lang="en-US" dirty="0"/>
-              <a:t>The Design</a:t>
-            </a:r>
-          </a:p>
-        </p:txBody>
-      </p:sp>
-      <p:sp>
-        <p:nvSpPr>
-          <p:cNvPr id="3" name="Content Placeholder 2"/>
+              <a:t>The Team</a:t>
+            </a:r>
+          </a:p>
+        </p:txBody>
+      </p:sp>
+      <p:sp>
+        <p:nvSpPr>
+          <p:cNvPr id="3" name="Content Placeholder 2">
+            <a:extLst>
+              <a:ext uri="{FF2B5EF4-FFF2-40B4-BE49-F238E27FC236}">
+                <a16:creationId xmlns:a16="http://schemas.microsoft.com/office/drawing/2014/main" id="{61CCEBAC-71BD-4FCB-A7F4-A6B9C2796C22}"/>
+              </a:ext>
+            </a:extLst>
+          </p:cNvPr>
           <p:cNvSpPr>
             <a:spLocks noGrp="1"/>
           </p:cNvSpPr>
@@ -3884,24 +4150,41 @@
           <a:bodyPr/>
           <a:lstStyle/>
           <a:p>
-            <a:endParaRPr lang="en-US"/>
-          </a:p>
-        </p:txBody>
-      </p:sp>
-      <p:sp>
-        <p:nvSpPr>
-          <p:cNvPr id="4" name="Text Placeholder 3"/>
-          <p:cNvSpPr>
-            <a:spLocks noGrp="1"/>
-          </p:cNvSpPr>
-          <p:nvPr>
-            <p:ph type="body" sz="quarter" idx="10"/>
-          </p:nvPr>
-        </p:nvSpPr>
-        <p:spPr/>
-        <p:txBody>
-          <a:bodyPr/>
-          <a:lstStyle/>
+            <a:r>
+              <a:rPr lang="en-US" dirty="0"/>
+              <a:t>Alexis J. Renderos – Project Lead, Chief Engineer</a:t>
+            </a:r>
+          </a:p>
+          <a:p>
+            <a:r>
+              <a:rPr lang="en-US" dirty="0"/>
+              <a:t>William Lavelle – Operations Director</a:t>
+            </a:r>
+          </a:p>
+          <a:p>
+            <a:r>
+              <a:rPr lang="en-US" dirty="0" err="1"/>
+              <a:t>Ritvik</a:t>
+            </a:r>
+            <a:r>
+              <a:rPr lang="en-US" dirty="0"/>
+              <a:t> </a:t>
+            </a:r>
+            <a:r>
+              <a:rPr lang="en-US" dirty="0" err="1"/>
+              <a:t>Maripally</a:t>
+            </a:r>
+            <a:r>
+              <a:rPr lang="en-US" dirty="0"/>
+              <a:t> – CAD Design and Data Collection</a:t>
+            </a:r>
+          </a:p>
+          <a:p>
+            <a:r>
+              <a:rPr lang="en-US" dirty="0"/>
+              <a:t>Rolf Anderson – Software Development</a:t>
+            </a:r>
+          </a:p>
           <a:p>
             <a:endParaRPr lang="en-US" dirty="0"/>
           </a:p>
@@ -3910,7 +4193,7 @@
     </p:spTree>
     <p:extLst>
       <p:ext uri="{BB962C8B-B14F-4D97-AF65-F5344CB8AC3E}">
-        <p14:creationId xmlns:p14="http://schemas.microsoft.com/office/powerpoint/2010/main" val="2028713658"/>
+        <p14:creationId xmlns:p14="http://schemas.microsoft.com/office/powerpoint/2010/main" val="1525094735"/>
       </p:ext>
     </p:extLst>
   </p:cSld>
@@ -3942,7 +4225,7 @@
           <p:cNvPr id="2" name="Title 1">
             <a:extLst>
               <a:ext uri="{FF2B5EF4-FFF2-40B4-BE49-F238E27FC236}">
-                <a16:creationId xmlns:a16="http://schemas.microsoft.com/office/drawing/2014/main" id="{FC3F2F3D-6BF7-49DC-87EE-AE58C420DDDE}"/>
+                <a16:creationId xmlns:a16="http://schemas.microsoft.com/office/drawing/2014/main" id="{CBFA227E-C30E-43F7-9C26-665E83626346}"/>
               </a:ext>
             </a:extLst>
           </p:cNvPr>
@@ -3960,7 +4243,7 @@
           <a:p>
             <a:r>
               <a:rPr lang="en-US" dirty="0"/>
-              <a:t>Hardware Features</a:t>
+              <a:t>Collaboration and Communication</a:t>
             </a:r>
           </a:p>
         </p:txBody>
@@ -3970,7 +4253,7 @@
           <p:cNvPr id="3" name="Content Placeholder 2">
             <a:extLst>
               <a:ext uri="{FF2B5EF4-FFF2-40B4-BE49-F238E27FC236}">
-                <a16:creationId xmlns:a16="http://schemas.microsoft.com/office/drawing/2014/main" id="{3D09B57D-0AA2-4005-82E1-12099A992819}"/>
+                <a16:creationId xmlns:a16="http://schemas.microsoft.com/office/drawing/2014/main" id="{51747839-6914-486E-A1FF-0096093685C1}"/>
               </a:ext>
             </a:extLst>
           </p:cNvPr>
@@ -3986,39 +4269,63 @@
           <a:bodyPr/>
           <a:lstStyle/>
           <a:p>
-            <a:endParaRPr lang="en-US"/>
-          </a:p>
-        </p:txBody>
-      </p:sp>
-      <p:sp>
-        <p:nvSpPr>
-          <p:cNvPr id="4" name="Text Placeholder 3">
-            <a:extLst>
-              <a:ext uri="{FF2B5EF4-FFF2-40B4-BE49-F238E27FC236}">
-                <a16:creationId xmlns:a16="http://schemas.microsoft.com/office/drawing/2014/main" id="{CFB14C2E-20BE-46C1-9E7E-7EB63B61C2F8}"/>
-              </a:ext>
-            </a:extLst>
-          </p:cNvPr>
-          <p:cNvSpPr>
-            <a:spLocks noGrp="1"/>
-          </p:cNvSpPr>
-          <p:nvPr>
-            <p:ph type="body" sz="quarter" idx="10"/>
-          </p:nvPr>
-        </p:nvSpPr>
-        <p:spPr/>
-        <p:txBody>
-          <a:bodyPr/>
-          <a:lstStyle/>
-          <a:p>
-            <a:endParaRPr lang="en-US"/>
+            <a:r>
+              <a:rPr lang="en-US" sz="2400" dirty="0"/>
+              <a:t>GroupMe</a:t>
+            </a:r>
+          </a:p>
+          <a:p>
+            <a:pPr lvl="1"/>
+            <a:r>
+              <a:rPr lang="en-US" sz="1600" dirty="0"/>
+              <a:t>We used this as the primary contact method between team members.</a:t>
+            </a:r>
+          </a:p>
+          <a:p>
+            <a:r>
+              <a:rPr lang="en-US" sz="2000" dirty="0"/>
+              <a:t>GitHub Organization</a:t>
+            </a:r>
+          </a:p>
+          <a:p>
+            <a:pPr lvl="1"/>
+            <a:r>
+              <a:rPr lang="en-US" sz="1600" dirty="0"/>
+              <a:t>We had two main repositories, one for code, and one for CAD. This allowed us to collaborate on different parts of the project easily and track contributions.</a:t>
+            </a:r>
+          </a:p>
+          <a:p>
+            <a:r>
+              <a:rPr lang="en-US" sz="2000" dirty="0"/>
+              <a:t>Google Drive</a:t>
+            </a:r>
+          </a:p>
+          <a:p>
+            <a:pPr lvl="1"/>
+            <a:r>
+              <a:rPr lang="en-US" sz="1600" dirty="0"/>
+              <a:t>Everything else that didn’t end up on one of the GitHub repositories ended up on a shared Google Drive. This was where most of our research and data went.</a:t>
+            </a:r>
+          </a:p>
+          <a:p>
+            <a:r>
+              <a:rPr lang="en-US" sz="2000" dirty="0"/>
+              <a:t>Email</a:t>
+            </a:r>
+          </a:p>
+          <a:p>
+            <a:pPr lvl="1"/>
+            <a:r>
+              <a:rPr lang="en-US" sz="1600" dirty="0"/>
+              <a:t>We used email as a more formal method of communicating with those outside of our project group, for example, Critical Tinkers Officers and our TA’s.</a:t>
+            </a:r>
           </a:p>
         </p:txBody>
       </p:sp>
     </p:spTree>
     <p:extLst>
       <p:ext uri="{BB962C8B-B14F-4D97-AF65-F5344CB8AC3E}">
-        <p14:creationId xmlns:p14="http://schemas.microsoft.com/office/powerpoint/2010/main" val="2079212300"/>
+        <p14:creationId xmlns:p14="http://schemas.microsoft.com/office/powerpoint/2010/main" val="1436975182"/>
       </p:ext>
     </p:extLst>
   </p:cSld>
@@ -4047,13 +4354,7 @@
       </p:grpSpPr>
       <p:sp>
         <p:nvSpPr>
-          <p:cNvPr id="2" name="Title 1">
-            <a:extLst>
-              <a:ext uri="{FF2B5EF4-FFF2-40B4-BE49-F238E27FC236}">
-                <a16:creationId xmlns:a16="http://schemas.microsoft.com/office/drawing/2014/main" id="{47A4424B-8F2B-42AA-B994-5770126AADA3}"/>
-              </a:ext>
-            </a:extLst>
-          </p:cNvPr>
+          <p:cNvPr id="2" name="Title 1"/>
           <p:cNvSpPr>
             <a:spLocks noGrp="1"/>
           </p:cNvSpPr>
@@ -4068,20 +4369,14 @@
           <a:p>
             <a:r>
               <a:rPr lang="en-US" dirty="0"/>
-              <a:t>Software</a:t>
-            </a:r>
-          </a:p>
-        </p:txBody>
-      </p:sp>
-      <p:sp>
-        <p:nvSpPr>
-          <p:cNvPr id="3" name="Content Placeholder 2">
-            <a:extLst>
-              <a:ext uri="{FF2B5EF4-FFF2-40B4-BE49-F238E27FC236}">
-                <a16:creationId xmlns:a16="http://schemas.microsoft.com/office/drawing/2014/main" id="{ADFCE7B1-3B9E-4BF7-9414-BA1DF50F4F68}"/>
-              </a:ext>
-            </a:extLst>
-          </p:cNvPr>
+              <a:t>The Design</a:t>
+            </a:r>
+          </a:p>
+        </p:txBody>
+      </p:sp>
+      <p:sp>
+        <p:nvSpPr>
+          <p:cNvPr id="3" name="Content Placeholder 2"/>
           <p:cNvSpPr>
             <a:spLocks noGrp="1"/>
           </p:cNvSpPr>
@@ -4100,13 +4395,7 @@
       </p:sp>
       <p:sp>
         <p:nvSpPr>
-          <p:cNvPr id="4" name="Text Placeholder 3">
-            <a:extLst>
-              <a:ext uri="{FF2B5EF4-FFF2-40B4-BE49-F238E27FC236}">
-                <a16:creationId xmlns:a16="http://schemas.microsoft.com/office/drawing/2014/main" id="{DA563F96-2307-4B93-BBFA-3B9A41F86D8D}"/>
-              </a:ext>
-            </a:extLst>
-          </p:cNvPr>
+          <p:cNvPr id="4" name="Text Placeholder 3"/>
           <p:cNvSpPr>
             <a:spLocks noGrp="1"/>
           </p:cNvSpPr>
@@ -4119,14 +4408,14 @@
           <a:bodyPr/>
           <a:lstStyle/>
           <a:p>
-            <a:endParaRPr lang="en-US"/>
+            <a:endParaRPr lang="en-US" dirty="0"/>
           </a:p>
         </p:txBody>
       </p:sp>
     </p:spTree>
     <p:extLst>
       <p:ext uri="{BB962C8B-B14F-4D97-AF65-F5344CB8AC3E}">
-        <p14:creationId xmlns:p14="http://schemas.microsoft.com/office/powerpoint/2010/main" val="2260750743"/>
+        <p14:creationId xmlns:p14="http://schemas.microsoft.com/office/powerpoint/2010/main" val="2028713658"/>
       </p:ext>
     </p:extLst>
   </p:cSld>
@@ -4158,6 +4447,222 @@
           <p:cNvPr id="2" name="Title 1">
             <a:extLst>
               <a:ext uri="{FF2B5EF4-FFF2-40B4-BE49-F238E27FC236}">
+                <a16:creationId xmlns:a16="http://schemas.microsoft.com/office/drawing/2014/main" id="{FC3F2F3D-6BF7-49DC-87EE-AE58C420DDDE}"/>
+              </a:ext>
+            </a:extLst>
+          </p:cNvPr>
+          <p:cNvSpPr>
+            <a:spLocks noGrp="1"/>
+          </p:cNvSpPr>
+          <p:nvPr>
+            <p:ph type="title"/>
+          </p:nvPr>
+        </p:nvSpPr>
+        <p:spPr/>
+        <p:txBody>
+          <a:bodyPr/>
+          <a:lstStyle/>
+          <a:p>
+            <a:r>
+              <a:rPr lang="en-US" dirty="0"/>
+              <a:t>Hardware Features</a:t>
+            </a:r>
+          </a:p>
+        </p:txBody>
+      </p:sp>
+      <p:sp>
+        <p:nvSpPr>
+          <p:cNvPr id="3" name="Content Placeholder 2">
+            <a:extLst>
+              <a:ext uri="{FF2B5EF4-FFF2-40B4-BE49-F238E27FC236}">
+                <a16:creationId xmlns:a16="http://schemas.microsoft.com/office/drawing/2014/main" id="{3D09B57D-0AA2-4005-82E1-12099A992819}"/>
+              </a:ext>
+            </a:extLst>
+          </p:cNvPr>
+          <p:cNvSpPr>
+            <a:spLocks noGrp="1"/>
+          </p:cNvSpPr>
+          <p:nvPr>
+            <p:ph idx="1"/>
+          </p:nvPr>
+        </p:nvSpPr>
+        <p:spPr/>
+        <p:txBody>
+          <a:bodyPr/>
+          <a:lstStyle/>
+          <a:p>
+            <a:endParaRPr lang="en-US"/>
+          </a:p>
+        </p:txBody>
+      </p:sp>
+      <p:sp>
+        <p:nvSpPr>
+          <p:cNvPr id="4" name="Text Placeholder 3">
+            <a:extLst>
+              <a:ext uri="{FF2B5EF4-FFF2-40B4-BE49-F238E27FC236}">
+                <a16:creationId xmlns:a16="http://schemas.microsoft.com/office/drawing/2014/main" id="{CFB14C2E-20BE-46C1-9E7E-7EB63B61C2F8}"/>
+              </a:ext>
+            </a:extLst>
+          </p:cNvPr>
+          <p:cNvSpPr>
+            <a:spLocks noGrp="1"/>
+          </p:cNvSpPr>
+          <p:nvPr>
+            <p:ph type="body" sz="quarter" idx="10"/>
+          </p:nvPr>
+        </p:nvSpPr>
+        <p:spPr/>
+        <p:txBody>
+          <a:bodyPr/>
+          <a:lstStyle/>
+          <a:p>
+            <a:endParaRPr lang="en-US"/>
+          </a:p>
+        </p:txBody>
+      </p:sp>
+    </p:spTree>
+    <p:extLst>
+      <p:ext uri="{BB962C8B-B14F-4D97-AF65-F5344CB8AC3E}">
+        <p14:creationId xmlns:p14="http://schemas.microsoft.com/office/powerpoint/2010/main" val="2079212300"/>
+      </p:ext>
+    </p:extLst>
+  </p:cSld>
+  <p:clrMapOvr>
+    <a:masterClrMapping/>
+  </p:clrMapOvr>
+</p:sld>
+</file>
+
+<file path=ppt/slides/slide7.xml><?xml version="1.0" encoding="utf-8"?>
+<p:sld xmlns:a="http://schemas.openxmlformats.org/drawingml/2006/main" xmlns:r="http://schemas.openxmlformats.org/officeDocument/2006/relationships" xmlns:p="http://schemas.openxmlformats.org/presentationml/2006/main">
+  <p:cSld>
+    <p:spTree>
+      <p:nvGrpSpPr>
+        <p:cNvPr id="1" name=""/>
+        <p:cNvGrpSpPr/>
+        <p:nvPr/>
+      </p:nvGrpSpPr>
+      <p:grpSpPr>
+        <a:xfrm>
+          <a:off x="0" y="0"/>
+          <a:ext cx="0" cy="0"/>
+          <a:chOff x="0" y="0"/>
+          <a:chExt cx="0" cy="0"/>
+        </a:xfrm>
+      </p:grpSpPr>
+      <p:sp>
+        <p:nvSpPr>
+          <p:cNvPr id="2" name="Title 1">
+            <a:extLst>
+              <a:ext uri="{FF2B5EF4-FFF2-40B4-BE49-F238E27FC236}">
+                <a16:creationId xmlns:a16="http://schemas.microsoft.com/office/drawing/2014/main" id="{47A4424B-8F2B-42AA-B994-5770126AADA3}"/>
+              </a:ext>
+            </a:extLst>
+          </p:cNvPr>
+          <p:cNvSpPr>
+            <a:spLocks noGrp="1"/>
+          </p:cNvSpPr>
+          <p:nvPr>
+            <p:ph type="title"/>
+          </p:nvPr>
+        </p:nvSpPr>
+        <p:spPr/>
+        <p:txBody>
+          <a:bodyPr/>
+          <a:lstStyle/>
+          <a:p>
+            <a:r>
+              <a:rPr lang="en-US" dirty="0"/>
+              <a:t>Software</a:t>
+            </a:r>
+          </a:p>
+        </p:txBody>
+      </p:sp>
+      <p:sp>
+        <p:nvSpPr>
+          <p:cNvPr id="3" name="Content Placeholder 2">
+            <a:extLst>
+              <a:ext uri="{FF2B5EF4-FFF2-40B4-BE49-F238E27FC236}">
+                <a16:creationId xmlns:a16="http://schemas.microsoft.com/office/drawing/2014/main" id="{ADFCE7B1-3B9E-4BF7-9414-BA1DF50F4F68}"/>
+              </a:ext>
+            </a:extLst>
+          </p:cNvPr>
+          <p:cNvSpPr>
+            <a:spLocks noGrp="1"/>
+          </p:cNvSpPr>
+          <p:nvPr>
+            <p:ph idx="1"/>
+          </p:nvPr>
+        </p:nvSpPr>
+        <p:spPr/>
+        <p:txBody>
+          <a:bodyPr/>
+          <a:lstStyle/>
+          <a:p>
+            <a:endParaRPr lang="en-US"/>
+          </a:p>
+        </p:txBody>
+      </p:sp>
+      <p:sp>
+        <p:nvSpPr>
+          <p:cNvPr id="4" name="Text Placeholder 3">
+            <a:extLst>
+              <a:ext uri="{FF2B5EF4-FFF2-40B4-BE49-F238E27FC236}">
+                <a16:creationId xmlns:a16="http://schemas.microsoft.com/office/drawing/2014/main" id="{DA563F96-2307-4B93-BBFA-3B9A41F86D8D}"/>
+              </a:ext>
+            </a:extLst>
+          </p:cNvPr>
+          <p:cNvSpPr>
+            <a:spLocks noGrp="1"/>
+          </p:cNvSpPr>
+          <p:nvPr>
+            <p:ph type="body" sz="quarter" idx="10"/>
+          </p:nvPr>
+        </p:nvSpPr>
+        <p:spPr/>
+        <p:txBody>
+          <a:bodyPr/>
+          <a:lstStyle/>
+          <a:p>
+            <a:endParaRPr lang="en-US"/>
+          </a:p>
+        </p:txBody>
+      </p:sp>
+    </p:spTree>
+    <p:extLst>
+      <p:ext uri="{BB962C8B-B14F-4D97-AF65-F5344CB8AC3E}">
+        <p14:creationId xmlns:p14="http://schemas.microsoft.com/office/powerpoint/2010/main" val="2260750743"/>
+      </p:ext>
+    </p:extLst>
+  </p:cSld>
+  <p:clrMapOvr>
+    <a:masterClrMapping/>
+  </p:clrMapOvr>
+</p:sld>
+</file>
+
+<file path=ppt/slides/slide8.xml><?xml version="1.0" encoding="utf-8"?>
+<p:sld xmlns:a="http://schemas.openxmlformats.org/drawingml/2006/main" xmlns:r="http://schemas.openxmlformats.org/officeDocument/2006/relationships" xmlns:p="http://schemas.openxmlformats.org/presentationml/2006/main">
+  <p:cSld>
+    <p:spTree>
+      <p:nvGrpSpPr>
+        <p:cNvPr id="1" name=""/>
+        <p:cNvGrpSpPr/>
+        <p:nvPr/>
+      </p:nvGrpSpPr>
+      <p:grpSpPr>
+        <a:xfrm>
+          <a:off x="0" y="0"/>
+          <a:ext cx="0" cy="0"/>
+          <a:chOff x="0" y="0"/>
+          <a:chExt cx="0" cy="0"/>
+        </a:xfrm>
+      </p:grpSpPr>
+      <p:sp>
+        <p:nvSpPr>
+          <p:cNvPr id="2" name="Title 1">
+            <a:extLst>
+              <a:ext uri="{FF2B5EF4-FFF2-40B4-BE49-F238E27FC236}">
                 <a16:creationId xmlns:a16="http://schemas.microsoft.com/office/drawing/2014/main" id="{6531AFBB-79AF-4715-8EAF-37C48B641D8C}"/>
               </a:ext>
             </a:extLst>
@@ -4244,7 +4749,7 @@
 </p:sld>
 </file>
 
-<file path=ppt/slides/slide7.xml><?xml version="1.0" encoding="utf-8"?>
+<file path=ppt/slides/slide9.xml><?xml version="1.0" encoding="utf-8"?>
 <p:sld xmlns:a="http://schemas.openxmlformats.org/drawingml/2006/main" xmlns:r="http://schemas.openxmlformats.org/officeDocument/2006/relationships" xmlns:p="http://schemas.openxmlformats.org/presentationml/2006/main">
   <p:cSld>
     <p:spTree>

</xml_diff>